<commit_message>
Deploying to gh-pages from @ ManuelePasini/slides-markdown@13dec941d5b65b27f250adf266c179ef9533dc15 🚀
</commit_message>
<xml_diff>
--- a/dolap_2024_slides.pptx
+++ b/dolap_2024_slides.pptx
@@ -3279,7 +3279,7 @@
       </p:sp>
       <p:pic>
         <p:nvPicPr>
-          <p:cNvPr descr="https://github.com/ManuelePasini/slides-markdown/blob/54b5e23a46e6eb5ba520af16ece79dc3538f6986/slides/images/alternative_feeding.png" id="0" name="Picture 1"/>
+          <p:cNvPr descr="https://github.com/ManuelePasini/slides-markdown/blob/4893698e949da4ee45c95087b170c011a4b9f687/slides/images/alternative_feeding.png?raw=true" id="0" name="Picture 1"/>
           <p:cNvPicPr>
             <a:picLocks noGrp="1" noChangeAspect="1"/>
           </p:cNvPicPr>
@@ -3293,8 +3293,8 @@
         </p:blipFill>
         <p:spPr bwMode="auto">
           <a:xfrm>
-            <a:off x="2413000" y="1193800"/>
-            <a:ext cx="4318000" cy="2882900"/>
+            <a:off x="2336800" y="1193800"/>
+            <a:ext cx="4483100" cy="2882900"/>
           </a:xfrm>
           <a:prstGeom prst="rect">
             <a:avLst/>

</xml_diff>

<commit_message>
Deploying to gh-pages from @ ManuelePasini/slides-markdown@70b67a208616343f865c2ace9bc297c742e43f30 🚀
</commit_message>
<xml_diff>
--- a/dolap_2024_slides.pptx
+++ b/dolap_2024_slides.pptx
@@ -24,7 +24,6 @@
     <p:sldId id="272" r:id="rId18"/>
     <p:sldId id="273" r:id="rId19"/>
     <p:sldId id="274" r:id="rId20"/>
-    <p:sldId id="275" r:id="rId21"/>
   </p:sldIdLst>
   <p:sldSz cx="9144000" cy="5143500" type="screen16x9"/>
   <p:notesSz cx="6858000" cy="9144000"/>
@@ -3414,36 +3413,6 @@
                 </a:r>
               </a:p>
               <a:p>
-                <a:pPr lvl="0"/>
-                <a:r>
-                  <a:rPr/>
-                  <a:t>There are </a:t>
-                </a:r>
-                <a:r>
-                  <a:rPr i="1"/>
-                  <a:t>dependencies</a:t>
-                </a:r>
-                <a:r>
-                  <a:rPr/>
-                  <a:t> between services (a service requires another)</a:t>
-                </a:r>
-              </a:p>
-              <a:p>
-                <a:pPr lvl="0"/>
-                <a:r>
-                  <a:rPr/>
-                  <a:t>There are </a:t>
-                </a:r>
-                <a:r>
-                  <a:rPr i="1"/>
-                  <a:t>preferences</a:t>
-                </a:r>
-                <a:r>
-                  <a:rPr/>
-                  <a:t> in their choice (performance/marketing reasons)</a:t>
-                </a:r>
-              </a:p>
-              <a:p>
                 <a:pPr lvl="0" indent="0" marL="0">
                   <a:buNone/>
                 </a:pPr>
@@ -3857,17 +3826,11 @@
                 <a:pPr lvl="0"/>
                 <a:r>
                   <a:rPr/>
-                  <a:t>Tag </a:t>
-                </a:r>
-                <a:r>
-                  <a:rPr>
-                    <a:latin typeface="Courier"/>
-                  </a:rPr>
-                  <a:t>(Preferred, True)</a:t>
-                </a:r>
-                <a:r>
-                  <a:rPr/>
-                  <a:t> to specify whether a service should be considered more than others</a:t>
+                  <a:t>Nodes can be labelled as </a:t>
+                </a:r>
+                <a:r>
+                  <a:rPr i="1"/>
+                  <a:t>preferred</a:t>
                 </a:r>
               </a:p>
               <a:p>
@@ -4454,14 +4417,6 @@
                   <a:rPr i="1"/>
                   <a:t>Flow</a:t>
                 </a:r>
-                <a:r>
-                  <a:rPr/>
-                  <a:t> and connect with at least one </a:t>
-                </a:r>
-                <a:r>
-                  <a:rPr i="1"/>
-                  <a:t>Process</a:t>
-                </a:r>
               </a:p>
               <a:p>
                 <a:pPr lvl="0"/>
@@ -4707,7 +4662,7 @@
                 </a:pPr>
                 <a:r>
                   <a:rPr/>
-                  <a:t>Finding the candidate implementations for our data platform requires to match the DFD and service graphs</a:t>
+                  <a:t>Building our blueprint requires to match the DFD and service graphs</a:t>
                 </a:r>
               </a:p>
               <a:p>
@@ -4727,14 +4682,14 @@
                 <a:pPr lvl="0"/>
                 <a:r>
                   <a:rPr/>
-                  <a:t>Each process and repository in the DFD is enriched with the tags from the previously identified taxonomies</a:t>
+                  <a:t>Each process and repository in the DFD is enriched with the tags from the previously identified taxonomy</a:t>
                 </a:r>
               </a:p>
               <a:p>
-                <a:pPr lvl="0"/>
+                <a:pPr lvl="1"/>
                 <a:r>
                   <a:rPr/>
-                  <a:t>To characterize them, clients answer an additional set of questions that are driven by the tag taxonomies</a:t>
+                  <a:t>To characterize them, clients answer an additional set of questions driven by the tag taxonomy</a:t>
                 </a:r>
               </a:p>
               <a:p>
@@ -4959,323 +4914,6 @@
                   <a:rPr i="1"/>
                   <a:t>if the service has the same or more functionalities</a:t>
                 </a:r>
-              </a:p>
-              <a:p>
-                <a:pPr lvl="1"/>
-                <a:r>
-                  <a:rPr/>
-                  <a:t>A DFD node </a:t>
-                </a:r>
-                <a14:m>
-                  <m:oMath xmlns:m="http://schemas.openxmlformats.org/officeDocument/2006/math">
-                    <m:sSup>
-                      <m:e>
-                        <m:r>
-                          <m:t>n</m:t>
-                        </m:r>
-                      </m:e>
-                      <m:sup>
-                        <m:r>
-                          <m:t>D</m:t>
-                        </m:r>
-                      </m:sup>
-                    </m:sSup>
-                  </m:oMath>
-                </a14:m>
-                <a:r>
-                  <a:rPr/>
-                  <a:t> matches a service node </a:t>
-                </a:r>
-                <a14:m>
-                  <m:oMath xmlns:m="http://schemas.openxmlformats.org/officeDocument/2006/math">
-                    <m:sSup>
-                      <m:e>
-                        <m:r>
-                          <m:t>n</m:t>
-                        </m:r>
-                      </m:e>
-                      <m:sup>
-                        <m:r>
-                          <m:t>S</m:t>
-                        </m:r>
-                      </m:sup>
-                    </m:sSup>
-                  </m:oMath>
-                </a14:m>
-                <a:r>
-                  <a:rPr/>
-                  <a:t> if each property in </a:t>
-                </a:r>
-                <a14:m>
-                  <m:oMath xmlns:m="http://schemas.openxmlformats.org/officeDocument/2006/math">
-                    <m:r>
-                      <m:t>p</m:t>
-                    </m:r>
-                    <m:r>
-                      <m:t>r</m:t>
-                    </m:r>
-                    <m:r>
-                      <m:t>o</m:t>
-                    </m:r>
-                    <m:r>
-                      <m:t>p</m:t>
-                    </m:r>
-                    <m:r>
-                      <m:t>s</m:t>
-                    </m:r>
-                    <m:d>
-                      <m:dPr>
-                        <m:begChr m:val="("/>
-                        <m:endChr m:val=")"/>
-                        <m:sepChr m:val=""/>
-                        <m:grow/>
-                      </m:dPr>
-                      <m:e>
-                        <m:sSup>
-                          <m:e>
-                            <m:r>
-                              <m:t>n</m:t>
-                            </m:r>
-                          </m:e>
-                          <m:sup>
-                            <m:r>
-                              <m:t>D</m:t>
-                            </m:r>
-                          </m:sup>
-                        </m:sSup>
-                      </m:e>
-                    </m:d>
-                  </m:oMath>
-                </a14:m>
-                <a:r>
-                  <a:rPr/>
-                  <a:t> matches a property in </a:t>
-                </a:r>
-                <a14:m>
-                  <m:oMath xmlns:m="http://schemas.openxmlformats.org/officeDocument/2006/math">
-                    <m:r>
-                      <m:t>p</m:t>
-                    </m:r>
-                    <m:r>
-                      <m:t>r</m:t>
-                    </m:r>
-                    <m:r>
-                      <m:t>o</m:t>
-                    </m:r>
-                    <m:r>
-                      <m:t>p</m:t>
-                    </m:r>
-                    <m:r>
-                      <m:t>s</m:t>
-                    </m:r>
-                    <m:d>
-                      <m:dPr>
-                        <m:begChr m:val="("/>
-                        <m:endChr m:val=")"/>
-                        <m:sepChr m:val=""/>
-                        <m:grow/>
-                      </m:dPr>
-                      <m:e>
-                        <m:sSup>
-                          <m:e>
-                            <m:r>
-                              <m:t>n</m:t>
-                            </m:r>
-                          </m:e>
-                          <m:sup>
-                            <m:r>
-                              <m:t>S</m:t>
-                            </m:r>
-                          </m:sup>
-                        </m:sSup>
-                      </m:e>
-                    </m:d>
-                  </m:oMath>
-                </a14:m>
-              </a:p>
-              <a:p>
-                <a:pPr lvl="1"/>
-                <a:r>
-                  <a:rPr/>
-                  <a:t>A property </a:t>
-                </a:r>
-                <a14:m>
-                  <m:oMath xmlns:m="http://schemas.openxmlformats.org/officeDocument/2006/math">
-                    <m:d>
-                      <m:dPr>
-                        <m:begChr m:val="("/>
-                        <m:endChr m:val=")"/>
-                        <m:sepChr m:val=""/>
-                        <m:grow/>
-                      </m:dPr>
-                      <m:e>
-                        <m:sSub>
-                          <m:e>
-                            <m:r>
-                              <m:t>h</m:t>
-                            </m:r>
-                          </m:e>
-                          <m:sub>
-                            <m:r>
-                              <m:t>i</m:t>
-                            </m:r>
-                          </m:sub>
-                        </m:sSub>
-                        <m:r>
-                          <m:rPr>
-                            <m:sty m:val="p"/>
-                          </m:rPr>
-                          <m:t>,</m:t>
-                        </m:r>
-                        <m:sSub>
-                          <m:e>
-                            <m:r>
-                              <m:t>v</m:t>
-                            </m:r>
-                          </m:e>
-                          <m:sub>
-                            <m:r>
-                              <m:t>i</m:t>
-                            </m:r>
-                          </m:sub>
-                        </m:sSub>
-                      </m:e>
-                    </m:d>
-                  </m:oMath>
-                </a14:m>
-                <a:r>
-                  <a:rPr/>
-                  <a:t> matches another property </a:t>
-                </a:r>
-                <a14:m>
-                  <m:oMath xmlns:m="http://schemas.openxmlformats.org/officeDocument/2006/math">
-                    <m:d>
-                      <m:dPr>
-                        <m:begChr m:val="("/>
-                        <m:endChr m:val=")"/>
-                        <m:sepChr m:val=""/>
-                        <m:grow/>
-                      </m:dPr>
-                      <m:e>
-                        <m:sSub>
-                          <m:e>
-                            <m:r>
-                              <m:t>h</m:t>
-                            </m:r>
-                          </m:e>
-                          <m:sub>
-                            <m:r>
-                              <m:t>j</m:t>
-                            </m:r>
-                          </m:sub>
-                        </m:sSub>
-                        <m:r>
-                          <m:rPr>
-                            <m:sty m:val="p"/>
-                          </m:rPr>
-                          <m:t>,</m:t>
-                        </m:r>
-                        <m:sSub>
-                          <m:e>
-                            <m:r>
-                              <m:t>v</m:t>
-                            </m:r>
-                          </m:e>
-                          <m:sub>
-                            <m:r>
-                              <m:t>j</m:t>
-                            </m:r>
-                          </m:sub>
-                        </m:sSub>
-                      </m:e>
-                    </m:d>
-                  </m:oMath>
-                </a14:m>
-                <a:r>
-                  <a:rPr/>
-                  <a:t> if </a:t>
-                </a:r>
-                <a14:m>
-                  <m:oMath xmlns:m="http://schemas.openxmlformats.org/officeDocument/2006/math">
-                    <m:sSub>
-                      <m:e>
-                        <m:r>
-                          <m:t>h</m:t>
-                        </m:r>
-                      </m:e>
-                      <m:sub>
-                        <m:r>
-                          <m:t>i</m:t>
-                        </m:r>
-                      </m:sub>
-                    </m:sSub>
-                    <m:r>
-                      <m:rPr>
-                        <m:sty m:val="p"/>
-                      </m:rPr>
-                      <m:t>=</m:t>
-                    </m:r>
-                    <m:sSub>
-                      <m:e>
-                        <m:r>
-                          <m:t>h</m:t>
-                        </m:r>
-                      </m:e>
-                      <m:sub>
-                        <m:r>
-                          <m:t>j</m:t>
-                        </m:r>
-                      </m:sub>
-                    </m:sSub>
-                  </m:oMath>
-                </a14:m>
-                <a:r>
-                  <a:rPr/>
-                  <a:t> and </a:t>
-                </a:r>
-                <a14:m>
-                  <m:oMath xmlns:m="http://schemas.openxmlformats.org/officeDocument/2006/math">
-                    <m:sSub>
-                      <m:e>
-                        <m:r>
-                          <m:t>v</m:t>
-                        </m:r>
-                      </m:e>
-                      <m:sub>
-                        <m:r>
-                          <m:t>i</m:t>
-                        </m:r>
-                      </m:sub>
-                    </m:sSub>
-                    <m:sSub>
-                      <m:e>
-                        <m:r>
-                          <m:rPr>
-                            <m:sty m:val="p"/>
-                          </m:rPr>
-                          <m:t>≥</m:t>
-                        </m:r>
-                      </m:e>
-                      <m:sub>
-                        <m:r>
-                          <m:t>h</m:t>
-                        </m:r>
-                      </m:sub>
-                    </m:sSub>
-                    <m:sSub>
-                      <m:e>
-                        <m:r>
-                          <m:t>v</m:t>
-                        </m:r>
-                      </m:e>
-                      <m:sub>
-                        <m:r>
-                          <m:t>j</m:t>
-                        </m:r>
-                      </m:sub>
-                    </m:sSub>
-                  </m:oMath>
-                </a14:m>
               </a:p>
               <a:p>
                 <a:pPr lvl="1"/>
@@ -6235,7 +5873,7 @@
                 <a:spLocks noGrp="1"/>
               </p:cNvSpPr>
               <p:nvPr>
-                <p:ph idx="1"/>
+                <p:ph idx="1" sz="half"/>
               </p:nvPr>
             </p:nvSpPr>
             <p:spPr/>
@@ -6262,10 +5900,6 @@
                 <a:r>
                   <a:rPr i="1"/>
                   <a:t>selected services is minimized</a:t>
-                </a:r>
-                <a:r>
-                  <a:rPr/>
-                  <a:t> (goal: minimize the economic and management cost of the platform)</a:t>
                 </a:r>
               </a:p>
               <a:p>
@@ -6417,11 +6051,10 @@
                     </m:d>
                   </m:oMath>
                 </a14:m>
-              </a:p>
-              <a:p>
-                <a:pPr lvl="0" indent="0" marL="0">
-                  <a:buNone/>
-                </a:pPr>
+                <a:r>
+                  <a:rPr/>
+                  <a:t> e </a:t>
+                </a:r>
                 <a14:m>
                   <m:oMath xmlns:m="http://schemas.openxmlformats.org/officeDocument/2006/math">
                     <m:m>
@@ -7899,6 +7532,49 @@
           </p:sp>
         </mc:Choice>
       </mc:AlternateContent>
+      <p:sp>
+        <p:nvSpPr>
+          <p:cNvPr id="4" name="Content Placeholder 3"/>
+          <p:cNvSpPr>
+            <a:spLocks noGrp="1"/>
+          </p:cNvSpPr>
+          <p:nvPr>
+            <p:ph idx="2" sz="half"/>
+          </p:nvPr>
+        </p:nvSpPr>
+        <p:spPr/>
+        <p:txBody>
+          <a:bodyPr/>
+          <a:lstStyle/>
+          <a:p>
+            <a:pPr lvl="0" indent="0" marL="1270000">
+              <a:buNone/>
+            </a:pPr>
+            <a:r>
+              <a:rPr sz="2000" b="1"/>
+              <a:t>Optimal blueprint</a:t>
+            </a:r>
+          </a:p>
+          <a:p>
+            <a:pPr lvl="0" indent="0" marL="1270000">
+              <a:buNone/>
+            </a:pPr>
+            <a:r>
+              <a:rPr sz="2000"/>
+              <a:t>Services selected (in bold) for the blueprint of the data platform</a:t>
+            </a:r>
+          </a:p>
+          <a:p>
+            <a:pPr lvl="0" indent="0" marL="1270000">
+              <a:buNone/>
+            </a:pPr>
+            <a:r>
+              <a:rPr sz="2000"/>
+              <a:t>Services selected (in bold) for the blueprint of the data platform</a:t>
+            </a:r>
+          </a:p>
+        </p:txBody>
+      </p:sp>
     </p:spTree>
   </p:cSld>
 </p:sld>
@@ -7941,67 +7617,119 @@
             </a:pPr>
             <a:r>
               <a:rPr/>
-              <a:t>Optimal blueprint</a:t>
-            </a:r>
-          </a:p>
-        </p:txBody>
-      </p:sp>
-      <p:pic>
-        <p:nvPicPr>
-          <p:cNvPr descr="https://w4bo.github.io/DOLAP-2024-DataPlat/img/graph.svg" id="0" name="Picture 1"/>
-          <p:cNvPicPr>
-            <a:picLocks noGrp="1" noChangeAspect="1"/>
-          </p:cNvPicPr>
-          <p:nvPr/>
-        </p:nvPicPr>
-        <p:blipFill>
-          <a:blip r:embed="rId2"/>
-          <a:stretch>
-            <a:fillRect/>
-          </a:stretch>
-        </p:blipFill>
-        <p:spPr bwMode="auto">
-          <a:xfrm>
-            <a:off x="2667000" y="1193800"/>
-            <a:ext cx="3797300" cy="2882900"/>
-          </a:xfrm>
-          <a:prstGeom prst="rect">
-            <a:avLst/>
-          </a:prstGeom>
-          <a:noFill/>
-          <a:ln w="9525">
-            <a:noFill/>
-            <a:headEnd/>
-            <a:tailEnd/>
-          </a:ln>
-        </p:spPr>
-      </p:pic>
-      <p:sp>
-        <p:nvSpPr>
-          <p:cNvPr id="1" name="TextBox 3"/>
-          <p:cNvSpPr txBox="1"/>
-          <p:nvPr/>
-        </p:nvSpPr>
-        <p:spPr>
-          <a:xfrm>
-            <a:off x="457200" y="4076700"/>
-            <a:ext cx="8229600" cy="508000"/>
-          </a:xfrm>
-          <a:prstGeom prst="rect">
-            <a:avLst/>
-          </a:prstGeom>
-          <a:noFill/>
-        </p:spPr>
+              <a:t>Conclusion and future works</a:t>
+            </a:r>
+          </a:p>
+        </p:txBody>
+      </p:sp>
+      <p:sp>
+        <p:nvSpPr>
+          <p:cNvPr id="3" name="Content Placeholder 2"/>
+          <p:cNvSpPr>
+            <a:spLocks noGrp="1"/>
+          </p:cNvSpPr>
+          <p:nvPr>
+            <p:ph idx="1"/>
+          </p:nvPr>
+        </p:nvSpPr>
+        <p:spPr/>
         <p:txBody>
           <a:bodyPr/>
           <a:lstStyle/>
           <a:p>
-            <a:pPr lvl="0" indent="0" marL="0" algn="ctr">
+            <a:pPr lvl="0" indent="0" marL="0">
               <a:buNone/>
             </a:pPr>
             <a:r>
               <a:rPr/>
-              <a:t>Services selected (in bold) for the blueprint of the data platform</a:t>
+              <a:t>The design of data platforms is a nontrivial task</a:t>
+            </a:r>
+          </a:p>
+          <a:p>
+            <a:pPr lvl="0"/>
+            <a:r>
+              <a:rPr/>
+              <a:t>We introduced a </a:t>
+            </a:r>
+            <a:r>
+              <a:rPr b="1"/>
+              <a:t>process-driven design methodology</a:t>
+            </a:r>
+            <a:r>
+              <a:rPr/>
+              <a:t> to </a:t>
+            </a:r>
+            <a:r>
+              <a:rPr i="1"/>
+              <a:t>aid designers</a:t>
+            </a:r>
+            <a:r>
+              <a:rPr/>
+              <a:t> in selecting the optimal services out of a service ecosystem</a:t>
+            </a:r>
+          </a:p>
+          <a:p>
+            <a:pPr lvl="0"/>
+            <a:r>
+              <a:rPr/>
+              <a:t>We have addressed such </a:t>
+            </a:r>
+            <a:r>
+              <a:rPr b="1"/>
+              <a:t>selection as a facility location optimization problem</a:t>
+            </a:r>
+          </a:p>
+          <a:p>
+            <a:pPr lvl="0" indent="0" marL="0">
+              <a:buNone/>
+            </a:pPr>
+            <a:r>
+              <a:rPr/>
+              <a:t>Improvement in multiple aspects</a:t>
+            </a:r>
+          </a:p>
+          <a:p>
+            <a:pPr lvl="0"/>
+            <a:r>
+              <a:rPr b="1"/>
+              <a:t>Expressivenes</a:t>
+            </a:r>
+            <a:r>
+              <a:rPr/>
+              <a:t>: matching and selection should consider more complex architectural patterns (Lakehouse to replace both data lakes and warehouses) as well as support additional constraints (e.g., consider only some service vendors).</a:t>
+            </a:r>
+          </a:p>
+          <a:p>
+            <a:pPr lvl="0"/>
+            <a:r>
+              <a:rPr b="1"/>
+              <a:t>User evaluation</a:t>
+            </a:r>
+            <a:r>
+              <a:rPr/>
+              <a:t>: the produced blueprints should be compared with the ones recommended by expert designers.</a:t>
+            </a:r>
+          </a:p>
+          <a:p>
+            <a:pPr lvl="0"/>
+            <a:r>
+              <a:rPr i="1"/>
+              <a:t>Resource provisioning</a:t>
+            </a:r>
+            <a:r>
+              <a:rPr/>
+              <a:t>: a complete approach should also consider how many instances of a service are required (to do so, a cost model should be studied).</a:t>
+            </a:r>
+          </a:p>
+          <a:p>
+            <a:pPr lvl="0"/>
+            <a:r>
+              <a:rPr i="1"/>
+              <a:t>Metadata integration</a:t>
+            </a:r>
+            <a:r>
+              <a:rPr/>
+              <a:t>: while catalog and meta-data management services do not directly introduce functionalities for data transformation and exploitation, the design should also recommend services helping in the management of the platform itself.</a:t>
             </a:r>
           </a:p>
         </p:txBody>
@@ -8047,8 +7775,8 @@
               <a:buNone/>
             </a:pPr>
             <a:r>
-              <a:rPr/>
-              <a:t>Conclusion and future works</a:t>
+              <a:rPr i="1"/>
+              <a:t>Thanks!</a:t>
             </a:r>
           </a:p>
         </p:txBody>
@@ -8073,94 +7801,7 @@
             </a:pPr>
             <a:r>
               <a:rPr/>
-              <a:t>The design of data platforms is a nontrivial task</a:t>
-            </a:r>
-          </a:p>
-          <a:p>
-            <a:pPr lvl="0"/>
-            <a:r>
-              <a:rPr/>
-              <a:t>We introduced a </a:t>
-            </a:r>
-            <a:r>
-              <a:rPr b="1"/>
-              <a:t>process-driven design methodology</a:t>
-            </a:r>
-            <a:r>
-              <a:rPr/>
-              <a:t> to </a:t>
-            </a:r>
-            <a:r>
-              <a:rPr i="1"/>
-              <a:t>aid designers</a:t>
-            </a:r>
-            <a:r>
-              <a:rPr/>
-              <a:t> in selecting the optimal services out of a service ecosystem</a:t>
-            </a:r>
-          </a:p>
-          <a:p>
-            <a:pPr lvl="0"/>
-            <a:r>
-              <a:rPr/>
-              <a:t>We have addressed such </a:t>
-            </a:r>
-            <a:r>
-              <a:rPr b="1"/>
-              <a:t>selection as a facility location optimization problem</a:t>
-            </a:r>
-          </a:p>
-          <a:p>
-            <a:pPr lvl="0" indent="0" marL="0">
-              <a:buNone/>
-            </a:pPr>
-            <a:r>
-              <a:rPr/>
-              <a:t>Improvement in multiple aspects</a:t>
-            </a:r>
-          </a:p>
-          <a:p>
-            <a:pPr lvl="0"/>
-            <a:r>
-              <a:rPr b="1"/>
-              <a:t>Expressivenes</a:t>
-            </a:r>
-            <a:r>
-              <a:rPr/>
-              <a:t>: matching and selection should consider more complex architectural patterns (Lakehouse to replace both data lakes and warehouses) as well as support additional constraints (e.g., consider only some service vendors).</a:t>
-            </a:r>
-          </a:p>
-          <a:p>
-            <a:pPr lvl="0"/>
-            <a:r>
-              <a:rPr b="1"/>
-              <a:t>User evaluation</a:t>
-            </a:r>
-            <a:r>
-              <a:rPr/>
-              <a:t>: the produced blueprints should be compared with the ones recommended by expert designers.</a:t>
-            </a:r>
-          </a:p>
-          <a:p>
-            <a:pPr lvl="0"/>
-            <a:r>
-              <a:rPr i="1"/>
-              <a:t>Resource provisioning</a:t>
-            </a:r>
-            <a:r>
-              <a:rPr/>
-              <a:t>: additionally to selecting the services, a complete approach should also consider how many instances of a service are required (to do so, a cost model should be studied).</a:t>
-            </a:r>
-          </a:p>
-          <a:p>
-            <a:pPr lvl="0"/>
-            <a:r>
-              <a:rPr i="1"/>
-              <a:t>Metadata integration</a:t>
-            </a:r>
-            <a:r>
-              <a:rPr/>
-              <a:t>: while catalog and meta-data management services do not directly introduce functionalities for data transformation and exploitation, the design should also recommend services helping in the management of the platform itself.</a:t>
+              <a:t>Questions?</a:t>
             </a:r>
           </a:p>
         </p:txBody>
@@ -8297,7 +7938,7 @@
             </a:r>
             <a:r>
               <a:rPr/>
-              <a:t>: changes in the implementation of a service do not affect other services</a:t>
+              <a:t>: changes in a a service do not affect others</a:t>
             </a:r>
           </a:p>
           <a:p>
@@ -8308,7 +7949,7 @@
             </a:r>
             <a:r>
               <a:rPr/>
-              <a:t>: services have interfaces that enable easy and frictionless composition</a:t>
+              <a:t>: services have interfaces enabling a frictionless composition</a:t>
             </a:r>
           </a:p>
           <a:p>
@@ -8320,109 +7961,6 @@
             <a:r>
               <a:rPr/>
               <a:t>: services cover the entire data life cycle</a:t>
-            </a:r>
-          </a:p>
-          <a:p>
-            <a:pPr lvl="0" indent="0" marL="0">
-              <a:buNone/>
-            </a:pPr>
-            <a:r>
-              <a:rPr/>
-              <a:t>Data platforms foster</a:t>
-            </a:r>
-          </a:p>
-          <a:p>
-            <a:pPr lvl="0"/>
-            <a:r>
-              <a:rPr i="1"/>
-              <a:t>Collaboration and shared governance</a:t>
-            </a:r>
-            <a:r>
-              <a:rPr/>
-              <a:t>: being (conceptually) centralized, data is unified following some integration and it is easier to ensure compliance with data protection and privacy laws</a:t>
-            </a:r>
-          </a:p>
-          <a:p>
-            <a:pPr lvl="0"/>
-            <a:r>
-              <a:rPr i="1"/>
-              <a:t>Scalability</a:t>
-            </a:r>
-            <a:r>
-              <a:rPr/>
-              <a:t>: being implemented on a distributed infrastructure, it is easy to scale out</a:t>
-            </a:r>
-          </a:p>
-        </p:txBody>
-      </p:sp>
-    </p:spTree>
-  </p:cSld>
-</p:sld>
-</file>
-
-<file path=ppt/slides/slide20.xml><?xml version="1.0" encoding="utf-8"?>
-<p:sld xmlns:a="http://schemas.openxmlformats.org/drawingml/2006/main" xmlns:r="http://schemas.openxmlformats.org/officeDocument/2006/relationships" xmlns:p="http://schemas.openxmlformats.org/presentationml/2006/main">
-  <p:cSld>
-    <p:spTree>
-      <p:nvGrpSpPr>
-        <p:cNvPr id="1" name=""/>
-        <p:cNvGrpSpPr/>
-        <p:nvPr/>
-      </p:nvGrpSpPr>
-      <p:grpSpPr>
-        <a:xfrm>
-          <a:off x="0" y="0"/>
-          <a:ext cx="0" cy="0"/>
-          <a:chOff x="0" y="0"/>
-          <a:chExt cx="0" cy="0"/>
-        </a:xfrm>
-      </p:grpSpPr>
-      <p:sp>
-        <p:nvSpPr>
-          <p:cNvPr id="2" name="Title 1"/>
-          <p:cNvSpPr>
-            <a:spLocks noGrp="1"/>
-          </p:cNvSpPr>
-          <p:nvPr>
-            <p:ph type="title"/>
-          </p:nvPr>
-        </p:nvSpPr>
-        <p:spPr/>
-        <p:txBody>
-          <a:bodyPr/>
-          <a:lstStyle/>
-          <a:p>
-            <a:pPr lvl="0" indent="0" marL="0">
-              <a:buNone/>
-            </a:pPr>
-            <a:r>
-              <a:rPr i="1"/>
-              <a:t>Thanks!</a:t>
-            </a:r>
-          </a:p>
-        </p:txBody>
-      </p:sp>
-      <p:sp>
-        <p:nvSpPr>
-          <p:cNvPr id="3" name="Content Placeholder 2"/>
-          <p:cNvSpPr>
-            <a:spLocks noGrp="1"/>
-          </p:cNvSpPr>
-          <p:nvPr>
-            <p:ph idx="1"/>
-          </p:nvPr>
-        </p:nvSpPr>
-        <p:spPr/>
-        <p:txBody>
-          <a:bodyPr/>
-          <a:lstStyle/>
-          <a:p>
-            <a:pPr lvl="0" indent="0" marL="0">
-              <a:buNone/>
-            </a:pPr>
-            <a:r>
-              <a:rPr/>
-              <a:t>Questions?</a:t>
             </a:r>
           </a:p>
         </p:txBody>
@@ -8688,21 +8226,6 @@
               <a:t>Third parties can publish their own services on marketplaces (e.g., AWS Marketplace)</a:t>
             </a:r>
           </a:p>
-          <a:p>
-            <a:pPr lvl="0"/>
-            <a:r>
-              <a:rPr/>
-              <a:t>Simply </a:t>
-            </a:r>
-            <a:r>
-              <a:rPr i="1"/>
-              <a:t>selecting “all” engines is not viable</a:t>
-            </a:r>
-            <a:r>
-              <a:rPr/>
-              <a:t> due to cost and management reasons</a:t>
-            </a:r>
-          </a:p>
         </p:txBody>
       </p:sp>
     </p:spTree>
@@ -8899,13 +8422,6 @@
             </a:r>
           </a:p>
           <a:p>
-            <a:pPr lvl="2"/>
-            <a:r>
-              <a:rPr/>
-              <a:t>e.g., whether disjoint databases and data warehouses or a single Lakehouse should be used</a:t>
-            </a:r>
-          </a:p>
-          <a:p>
             <a:pPr lvl="0"/>
             <a:r>
               <a:rPr/>
@@ -8917,34 +8433,6 @@
             <a:r>
               <a:rPr/>
               <a:t>They provide the necessary functionalities for big-data applications but not their implementation</a:t>
-            </a:r>
-          </a:p>
-          <a:p>
-            <a:pPr lvl="0"/>
-            <a:r>
-              <a:rPr/>
-              <a:t>Some frameworks have been proposed in literature</a:t>
-            </a:r>
-          </a:p>
-          <a:p>
-            <a:pPr lvl="1"/>
-            <a:r>
-              <a:rPr/>
-              <a:t>Choosing a single service</a:t>
-            </a:r>
-          </a:p>
-          <a:p>
-            <a:pPr lvl="1"/>
-            <a:r>
-              <a:rPr/>
-              <a:t>Cloud depoyment models</a:t>
-            </a:r>
-          </a:p>
-          <a:p>
-            <a:pPr lvl="1"/>
-            <a:r>
-              <a:rPr/>
-              <a:t>CSP selection</a:t>
             </a:r>
           </a:p>
         </p:txBody>
@@ -9027,14 +8515,14 @@
             </a:r>
             <a:r>
               <a:rPr/>
-              <a:t> are the backbone of a data platform and are congenial to designers since they encode many constraints on the choices to be made</a:t>
+              <a:t> are the backbone of a data platform encode many constraints on the choices to be made</a:t>
             </a:r>
           </a:p>
           <a:p>
             <a:pPr lvl="0"/>
             <a:r>
               <a:rPr/>
-              <a:t>… and outline the data flows!</a:t>
+              <a:t>… and outline data flows!</a:t>
             </a:r>
           </a:p>
           <a:p>
@@ -9113,7 +8601,7 @@
             </a:r>
             <a:r>
               <a:rPr sz="2000"/>
-              <a:t>: IT experts with in-depth knowledge of services available in the ecosystem</a:t>
+              <a:t>: IT experts with in-depth knowledge of services ecosystems</a:t>
             </a:r>
           </a:p>
           <a:p>
@@ -9124,7 +8612,7 @@
             </a:r>
             <a:r>
               <a:rPr sz="2000"/>
-              <a:t>: consultants or people with expertise in designing data flows but with no vertical knowledge on cloud/service ecosystems</a:t>
+              <a:t>: people with expertise in designing data flows but with no vertical knowledge on service ecosystems</a:t>
             </a:r>
           </a:p>
           <a:p>
@@ -9135,7 +8623,7 @@
             </a:r>
             <a:r>
               <a:rPr sz="2000"/>
-              <a:t> asking for the design of the data platform blueprint (e.g., partners involved in the same project)</a:t>
+              <a:t> asking for the design of the data platform blueprint</a:t>
             </a:r>
           </a:p>
         </p:txBody>
@@ -9277,14 +8765,14 @@
             <a:pPr lvl="0"/>
             <a:r>
               <a:rPr/>
-              <a:t>Many services, no necessity to consider all of them</a:t>
+              <a:t>Not necessarily all of them…</a:t>
             </a:r>
           </a:p>
           <a:p>
             <a:pPr lvl="0"/>
             <a:r>
               <a:rPr/>
-              <a:t>Services must cover the “basic” functionalities for a data platform such as the ones from NIST</a:t>
+              <a:t>… but they must cover the “basic” functionalities for a data platform such as the ones from NIST!</a:t>
             </a:r>
           </a:p>
         </p:txBody>

</xml_diff>

<commit_message>
Deploying to gh-pages from @ ManuelePasini/slides-markdown@ae3627a2c9f535855803df2f2b61e0773ea33807 🚀
</commit_message>
<xml_diff>
--- a/dolap_2024_slides.pptx
+++ b/dolap_2024_slides.pptx
@@ -3411,6 +3411,10 @@
                   <a:rPr i="1"/>
                   <a:t>service graph</a:t>
                 </a:r>
+                <a:r>
+                  <a:rPr/>
+                  <a:t>.</a:t>
+                </a:r>
               </a:p>
               <a:p>
                 <a:pPr lvl="0" indent="0" marL="0">
@@ -3483,7 +3487,7 @@
                 </a14:m>
                 <a:r>
                   <a:rPr/>
-                  <a:t> where</a:t>
+                  <a:t> where:</a:t>
                 </a:r>
               </a:p>
               <a:p>
@@ -3580,6 +3584,10 @@
                 <a:r>
                   <a:rPr i="1"/>
                   <a:t>nodes</a:t>
+                </a:r>
+                <a:r>
+                  <a:rPr/>
+                  <a:t>;</a:t>
                 </a:r>
               </a:p>
               <a:p>
@@ -3682,7 +3690,7 @@
                 </a:r>
                 <a:r>
                   <a:rPr/>
-                  <a:t> connecting nodes</a:t>
+                  <a:t> connecting nodes;</a:t>
                 </a:r>
               </a:p>
               <a:p>
@@ -3790,6 +3798,10 @@
                   <a:rPr i="1"/>
                   <a:t>properties</a:t>
                 </a:r>
+                <a:r>
+                  <a:rPr/>
+                  <a:t>;</a:t>
+                </a:r>
               </a:p>
               <a:p>
                 <a:pPr lvl="0"/>
@@ -3808,6 +3820,10 @@
                   <a:rPr i="1"/>
                   <a:t>labels</a:t>
                 </a:r>
+                <a:r>
+                  <a:rPr/>
+                  <a:t>.</a:t>
+                </a:r>
               </a:p>
               <a:p>
                 <a:pPr lvl="0" indent="0" marL="0">
@@ -3821,6 +3837,10 @@
                   <a:rPr i="1"/>
                   <a:t>Service</a:t>
                 </a:r>
+                <a:r>
+                  <a:rPr/>
+                  <a:t>:</a:t>
+                </a:r>
               </a:p>
               <a:p>
                 <a:pPr lvl="0"/>
@@ -3832,6 +3852,10 @@
                   <a:rPr i="1"/>
                   <a:t>preferred</a:t>
                 </a:r>
+                <a:r>
+                  <a:rPr/>
+                  <a:t>;</a:t>
+                </a:r>
               </a:p>
               <a:p>
                 <a:pPr lvl="0"/>
@@ -3845,7 +3869,7 @@
                 </a:r>
                 <a:r>
                   <a:rPr/>
-                  <a:t>, no services have the same tags</a:t>
+                  <a:t>, no services have the same tags.</a:t>
                 </a:r>
               </a:p>
               <a:p>
@@ -3860,6 +3884,10 @@
                   <a:rPr i="1"/>
                   <a:t>{Requires, IsCompatible}</a:t>
                 </a:r>
+                <a:r>
+                  <a:rPr/>
+                  <a:t>:</a:t>
+                </a:r>
               </a:p>
               <a:p>
                 <a:pPr lvl="0"/>
@@ -3869,7 +3897,7 @@
                 </a:r>
                 <a:r>
                   <a:rPr/>
-                  <a:t>: represents whether a service mandatorily relies on another</a:t>
+                  <a:t>: represents whether a service mandatorily relies on another;</a:t>
                 </a:r>
               </a:p>
               <a:p>
@@ -3880,7 +3908,7 @@
                 </a:r>
                 <a:r>
                   <a:rPr/>
-                  <a:t>: represents whether a service natively interfaces with another</a:t>
+                  <a:t>: represents whether a service natively interfaces with another.</a:t>
                 </a:r>
               </a:p>
             </p:txBody>
@@ -3954,6 +3982,10 @@
               </a:rPr>
               <a:t>Redshift</a:t>
             </a:r>
+            <a:r>
+              <a:rPr sz="2000"/>
+              <a:t>;</a:t>
+            </a:r>
           </a:p>
           <a:p>
             <a:pPr lvl="0"/>
@@ -3983,7 +4015,7 @@
             </a:r>
             <a:r>
               <a:rPr sz="2000"/>
-              <a:t> since it is deployed on it</a:t>
+              <a:t> since it is deployed on it.</a:t>
             </a:r>
           </a:p>
         </p:txBody>
@@ -4079,7 +4111,7 @@
             </a:r>
             <a:r>
               <a:rPr/>
-              <a:t> of their analysis</a:t>
+              <a:t> of their analysis.</a:t>
             </a:r>
           </a:p>
           <a:p>
@@ -4142,7 +4174,7 @@
             </a:r>
             <a:r>
               <a:rPr sz="2000"/>
-              <a:t> satellites</a:t>
+              <a:t> satellites.</a:t>
             </a:r>
           </a:p>
           <a:p>
@@ -4165,6 +4197,10 @@
               <a:rPr sz="2000" i="1"/>
               <a:t>periodically downloaded</a:t>
             </a:r>
+            <a:r>
+              <a:rPr sz="2000"/>
+              <a:t>.</a:t>
+            </a:r>
           </a:p>
           <a:p>
             <a:pPr lvl="0" indent="-342900" marL="342900">
@@ -4184,7 +4220,7 @@
             </a:r>
             <a:r>
               <a:rPr sz="2000"/>
-              <a:t> using mathematical and machine learning techniques</a:t>
+              <a:t> using mathematical and machine learning techniques.</a:t>
             </a:r>
           </a:p>
           <a:p>
@@ -4215,6 +4251,10 @@
               <a:rPr sz="2000" i="1"/>
               <a:t>positions of the sensors</a:t>
             </a:r>
+            <a:r>
+              <a:rPr sz="2000"/>
+              <a:t>.</a:t>
+            </a:r>
           </a:p>
           <a:p>
             <a:pPr lvl="0" indent="-342900" marL="342900">
@@ -4240,6 +4280,10 @@
               <a:rPr sz="2000" i="1"/>
               <a:t>integrated with enriched sensor data</a:t>
             </a:r>
+            <a:r>
+              <a:rPr sz="2000"/>
+              <a:t>.</a:t>
+            </a:r>
           </a:p>
           <a:p>
             <a:pPr lvl="0" indent="-342900" marL="342900">
@@ -4257,6 +4301,10 @@
               <a:rPr sz="2000" i="1"/>
               <a:t>out of enriched data</a:t>
             </a:r>
+            <a:r>
+              <a:rPr sz="2000"/>
+              <a:t>.</a:t>
+            </a:r>
           </a:p>
           <a:p>
             <a:pPr lvl="0" indent="-342900" marL="342900">
@@ -4277,6 +4325,10 @@
             <a:r>
               <a:rPr sz="2000" i="1"/>
               <a:t>decide how much to irrigate the soil</a:t>
+            </a:r>
+            <a:r>
+              <a:rPr sz="2000"/>
+              <a:t>.</a:t>
             </a:r>
           </a:p>
         </p:txBody>
@@ -4362,7 +4414,7 @@
                 </a:r>
                 <a:r>
                   <a:rPr/>
-                  <a:t> into DFDs</a:t>
+                  <a:t> into DFDs:</a:t>
                 </a:r>
               </a:p>
               <a:p>
@@ -4395,6 +4447,10 @@
                     </m:sSup>
                   </m:oMath>
                 </a14:m>
+                <a:r>
+                  <a:rPr/>
+                  <a:t>:</a:t>
+                </a:r>
               </a:p>
               <a:p>
                 <a:pPr lvl="1"/>
@@ -4406,6 +4462,10 @@
                   <a:rPr i="1"/>
                   <a:t>{Agent, Repository, Process}</a:t>
                 </a:r>
+                <a:r>
+                  <a:rPr/>
+                  <a:t>;</a:t>
+                </a:r>
               </a:p>
               <a:p>
                 <a:pPr lvl="1"/>
@@ -4417,6 +4477,10 @@
                   <a:rPr i="1"/>
                   <a:t>Flow</a:t>
                 </a:r>
+                <a:r>
+                  <a:rPr/>
+                  <a:t>.</a:t>
+                </a:r>
               </a:p>
               <a:p>
                 <a:pPr lvl="0"/>
@@ -4432,12 +4496,16 @@
                   <a:rPr i="1"/>
                   <a:t>high level of abstraction</a:t>
                 </a:r>
+                <a:r>
+                  <a:rPr/>
+                  <a:t>:</a:t>
+                </a:r>
               </a:p>
               <a:p>
                 <a:pPr lvl="1"/>
                 <a:r>
                   <a:rPr/>
-                  <a:t>Hide details such as decision points and interactions</a:t>
+                  <a:t>Hide details such as decision points and interactions;</a:t>
                 </a:r>
               </a:p>
               <a:p>
@@ -4458,6 +4526,10 @@
                   <a:rPr i="1"/>
                   <a:t>enough to return a blueprint</a:t>
                 </a:r>
+                <a:r>
+                  <a:rPr/>
+                  <a:t>.</a:t>
+                </a:r>
               </a:p>
               <a:p>
                 <a:pPr lvl="0"/>
@@ -4485,19 +4557,23 @@
                   <a:rPr i="1"/>
                   <a:t>repositories</a:t>
                 </a:r>
+                <a:r>
+                  <a:rPr/>
+                  <a:t>:</a:t>
+                </a:r>
               </a:p>
               <a:p>
                 <a:pPr lvl="1"/>
                 <a:r>
                   <a:rPr/>
-                  <a:t>Start from an aggregated overview</a:t>
+                  <a:t>Start from an aggregated overview;</a:t>
                 </a:r>
               </a:p>
               <a:p>
                 <a:pPr lvl="1"/>
                 <a:r>
                   <a:rPr/>
-                  <a:t>Recursively split candidate processes/repositories until each of them is characterized by homogeneous tags</a:t>
+                  <a:t>Recursively split candidate processes/repositories until each of them is characterized by homogeneous tags.</a:t>
                 </a:r>
               </a:p>
             </p:txBody>
@@ -4565,7 +4641,7 @@
             </a:r>
             <a:r>
               <a:rPr sz="2000"/>
-              <a:t> images are periodically downloaded</a:t>
+              <a:t> images are periodically downloaded;</a:t>
             </a:r>
           </a:p>
           <a:p>
@@ -4588,7 +4664,7 @@
             </a:r>
             <a:r>
               <a:rPr sz="2000"/>
-              <a:t> cannot be grouped, they contain heterogeneous data types</a:t>
+              <a:t> cannot be grouped, they contain heterogeneous data types.</a:t>
             </a:r>
           </a:p>
         </p:txBody>
@@ -4662,7 +4738,7 @@
                 </a:pPr>
                 <a:r>
                   <a:rPr/>
-                  <a:t>Building our blueprint requires to match the DFD and service graphs</a:t>
+                  <a:t>Building our blueprint requires to match the DFD and service graphs.</a:t>
                 </a:r>
               </a:p>
               <a:p>
@@ -4677,19 +4753,23 @@
                   <a:rPr i="1"/>
                   <a:t>the two must share the same characterization</a:t>
                 </a:r>
+                <a:r>
+                  <a:rPr/>
+                  <a:t>:</a:t>
+                </a:r>
               </a:p>
               <a:p>
                 <a:pPr lvl="0"/>
                 <a:r>
                   <a:rPr/>
-                  <a:t>Each process and repository in the DFD is enriched with the tags from the previously identified taxonomy</a:t>
+                  <a:t>Each process and repository in the DFD is enriched with the tags from the previously identified taxonomy:</a:t>
                 </a:r>
               </a:p>
               <a:p>
                 <a:pPr lvl="1"/>
                 <a:r>
                   <a:rPr/>
-                  <a:t>To characterize them, clients answer an additional set of questions driven by the tag taxonomy</a:t>
+                  <a:t>To characterize them, clients answer an additional set of questions driven by the tag taxonomy.</a:t>
                 </a:r>
               </a:p>
               <a:p>
@@ -4893,7 +4973,7 @@
                 </a:r>
                 <a:r>
                   <a:rPr/>
-                  <a:t> match them</a:t>
+                  <a:t> match them!</a:t>
                 </a:r>
               </a:p>
               <a:p>
@@ -4914,6 +4994,10 @@
                   <a:rPr i="1"/>
                   <a:t>if the service has the same or more functionalities</a:t>
                 </a:r>
+                <a:r>
+                  <a:rPr/>
+                  <a:t>;</a:t>
+                </a:r>
               </a:p>
               <a:p>
                 <a:pPr lvl="1"/>
@@ -4927,7 +5011,7 @@
                 </a:r>
                 <a:r>
                   <a:rPr/>
-                  <a:t> (e.g., a VM where any functionality can be implemented)</a:t>
+                  <a:t> (e.g., a VM where any functionality can be implemented).</a:t>
                 </a:r>
               </a:p>
               <a:p>
@@ -5733,7 +5817,7 @@
             </a:r>
             <a:r>
               <a:rPr/>
-              <a:t> that represent candidate implementations for the DFD processes/repositories</a:t>
+              <a:t> that represent candidate implementations for the DFD processes/repositories.</a:t>
             </a:r>
           </a:p>
           <a:p>
@@ -5791,6 +5875,10 @@
               </a:rPr>
               <a:t>Kinesis</a:t>
             </a:r>
+            <a:r>
+              <a:rPr sz="2000"/>
+              <a:t>;</a:t>
+            </a:r>
           </a:p>
           <a:p>
             <a:pPr lvl="0"/>
@@ -5812,7 +5900,7 @@
             </a:r>
             <a:r>
               <a:rPr sz="2000"/>
-              <a:t> can be discarded a priori since they are not reachable (i.e., they are neither candidate implementations nor required by other services)</a:t>
+              <a:t> can be discarded a priori since they are not reachable (i.e., they are neither candidate implementations nor required by other services).</a:t>
             </a:r>
           </a:p>
         </p:txBody>
@@ -5886,7 +5974,7 @@
                 </a:pPr>
                 <a:r>
                   <a:rPr/>
-                  <a:t>Out of all matching services, only some of them must be selected</a:t>
+                  <a:t>Out of all matching services, only some of them must be selected:</a:t>
                 </a:r>
               </a:p>
               <a:p>
@@ -5901,6 +5989,10 @@
                   <a:rPr i="1"/>
                   <a:t>selected services is minimized</a:t>
                 </a:r>
+                <a:r>
+                  <a:rPr/>
+                  <a:t>.</a:t>
+                </a:r>
               </a:p>
               <a:p>
                 <a:pPr lvl="0" indent="-342900" marL="342900">
@@ -5912,7 +6004,7 @@
                 </a:r>
                 <a:r>
                   <a:rPr/>
-                  <a:t>: all processes and repositories in the DFD must be covered</a:t>
+                  <a:t>: all processes and repositories in the DFD must be covered.</a:t>
                 </a:r>
               </a:p>
               <a:p>
@@ -5925,7 +6017,7 @@
                 </a:r>
                 <a:r>
                   <a:rPr/>
-                  <a:t>: if a service is selected, all its required services must be (recursively) selected too</a:t>
+                  <a:t>: if a service is selected, all its required services must be selected too.</a:t>
                 </a:r>
               </a:p>
               <a:p>
@@ -5938,7 +6030,7 @@
                 </a:r>
                 <a:r>
                   <a:rPr/>
-                  <a:t>: a service is selected only if it is compatible with the services selected for the previous/following nodes in the DFD</a:t>
+                  <a:t>: a service can be selected only if it is compatible with the services selected for the previous/following nodes in the DFD.</a:t>
                 </a:r>
               </a:p>
               <a:p>
@@ -5951,7 +6043,7 @@
                 </a:r>
                 <a:r>
                   <a:rPr/>
-                  <a:t>: preferred services should have more chances to be selected</a:t>
+                  <a:t>: preferred services should have more chances to be selected.</a:t>
                 </a:r>
               </a:p>
               <a:p>
@@ -5978,7 +6070,7 @@
                 </a:r>
                 <a:r>
                   <a:rPr/>
-                  <a:t> w/ Python + CPlex library)</a:t>
+                  <a:t> w/ Python + CPlex library).</a:t>
                 </a:r>
               </a:p>
               <a:p>
@@ -7642,7 +7734,7 @@
             </a:pPr>
             <a:r>
               <a:rPr/>
-              <a:t>The design of data platforms is a nontrivial task</a:t>
+              <a:t>The design of data platforms is a nontrivial task:</a:t>
             </a:r>
           </a:p>
           <a:p>
@@ -7665,7 +7757,7 @@
             </a:r>
             <a:r>
               <a:rPr/>
-              <a:t> in selecting the optimal services out of a service ecosystem</a:t>
+              <a:t> in selecting the optimal set of services out of a service ecosystem;</a:t>
             </a:r>
           </a:p>
           <a:p>
@@ -7678,6 +7770,10 @@
               <a:rPr b="1"/>
               <a:t>selection as a facility location optimization problem</a:t>
             </a:r>
+            <a:r>
+              <a:rPr/>
+              <a:t>.</a:t>
+            </a:r>
           </a:p>
           <a:p>
             <a:pPr lvl="0" indent="0" marL="0">
@@ -7685,7 +7781,7 @@
             </a:pPr>
             <a:r>
               <a:rPr/>
-              <a:t>Improvement in multiple aspects</a:t>
+              <a:t>Improvement in multiple aspects:</a:t>
             </a:r>
           </a:p>
           <a:p>
@@ -7881,7 +7977,7 @@
             </a:r>
             <a:r>
               <a:rPr/>
-              <a:t> is an infrastructure that facilitates the ingestion, storage, management, and exploitation of large volumes of heterogeneous data</a:t>
+              <a:t> is an infrastructure that facilitates the ingestion, storage, management, and exploitation of large volumes of heterogeneous data.</a:t>
             </a:r>
           </a:p>
           <a:p>
@@ -7916,7 +8012,7 @@
             </a:r>
             <a:r>
               <a:rPr/>
-              <a:t> needs of data pipelines</a:t>
+              <a:t> needs of data pipelines:</a:t>
             </a:r>
           </a:p>
           <a:p>
@@ -7927,7 +8023,7 @@
             </a:r>
             <a:r>
               <a:rPr/>
-              <a:t>: a data platform is conceptually a single and unified component</a:t>
+              <a:t>: a data platform is conceptually a single and unified component;</a:t>
             </a:r>
           </a:p>
           <a:p>
@@ -7938,7 +8034,7 @@
             </a:r>
             <a:r>
               <a:rPr/>
-              <a:t>: changes in a a service do not affect others</a:t>
+              <a:t>: changes in a a service do not affect others;</a:t>
             </a:r>
           </a:p>
           <a:p>
@@ -7949,7 +8045,7 @@
             </a:r>
             <a:r>
               <a:rPr/>
-              <a:t>: services have interfaces enabling a frictionless composition</a:t>
+              <a:t>: services have interfaces enabling a frictionless composition;</a:t>
             </a:r>
           </a:p>
           <a:p>
@@ -7960,7 +8056,7 @@
             </a:r>
             <a:r>
               <a:rPr/>
-              <a:t>: services cover the entire data life cycle</a:t>
+              <a:t>: services cover the entire data life cycle;</a:t>
             </a:r>
           </a:p>
         </p:txBody>
@@ -8030,7 +8126,7 @@
             <a:pPr lvl="0"/>
             <a:r>
               <a:rPr/>
-              <a:t>Data analytics nowadays mostly rely on cloud infrastructures</a:t>
+              <a:t>Data analytics nowadays mostly rely on cloud infrastructures:</a:t>
             </a:r>
           </a:p>
           <a:p>
@@ -8039,7 +8135,7 @@
             </a:pPr>
             <a:r>
               <a:rPr/>
-              <a:t>⇒ Data Platforms (DP) can be built on top of cloud infrastructures as facilitators of such analytics</a:t>
+              <a:t>⇒ Data Platforms (DP) can be built on top of cloud infrastructures as facilitators of such analytics;</a:t>
             </a:r>
           </a:p>
           <a:p>
@@ -8064,7 +8160,7 @@
             </a:r>
             <a:r>
               <a:rPr/>
-              <a:t> (CSPs)</a:t>
+              <a:t> (CSPs).</a:t>
             </a:r>
           </a:p>
           <a:p>
@@ -8192,6 +8288,10 @@
               <a:rPr i="1"/>
               <a:t>services with overlapping functionalities</a:t>
             </a:r>
+            <a:r>
+              <a:rPr/>
+              <a:t>;</a:t>
+            </a:r>
           </a:p>
           <a:p>
             <a:pPr lvl="0"/>
@@ -8205,7 +8305,7 @@
             </a:r>
             <a:r>
               <a:rPr/>
-              <a:t> that can hardly be mapped together</a:t>
+              <a:t> that can hardly be mapped together;</a:t>
             </a:r>
           </a:p>
           <a:p>
@@ -8218,12 +8318,16 @@
               <a:rPr i="1"/>
               <a:t>it is difficult to keep up with the pace</a:t>
             </a:r>
+            <a:r>
+              <a:rPr/>
+              <a:t>;</a:t>
+            </a:r>
           </a:p>
           <a:p>
             <a:pPr lvl="0"/>
             <a:r>
               <a:rPr/>
-              <a:t>Third parties can publish their own services on marketplaces (e.g., AWS Marketplace)</a:t>
+              <a:t>Third parties can publish their own services on marketplaces (e.g., AWS Marketplace);</a:t>
             </a:r>
           </a:p>
         </p:txBody>
@@ -8385,7 +8489,7 @@
             </a:pPr>
             <a:r>
               <a:rPr/>
-              <a:t>The design of data platforms is mainly left to the expertise of practitioners in the field</a:t>
+              <a:t>The design of data platforms is mainly left to the expertise of practitioners in the field.</a:t>
             </a:r>
           </a:p>
           <a:p>
@@ -8406,12 +8510,16 @@
               <a:rPr i="1"/>
               <a:t>multiple solutions could fulfill the desiderata</a:t>
             </a:r>
+            <a:r>
+              <a:rPr/>
+              <a:t>:</a:t>
+            </a:r>
           </a:p>
           <a:p>
             <a:pPr lvl="1"/>
             <a:r>
               <a:rPr/>
-              <a:t>it requires deep knowledge of CSPs’ ecosystems</a:t>
+              <a:t>It requires deep knowledge of CSPs’ ecosystems…</a:t>
             </a:r>
           </a:p>
           <a:p>
@@ -8425,14 +8533,14 @@
             <a:pPr lvl="0"/>
             <a:r>
               <a:rPr/>
-              <a:t>Several abstract big data architectures are available (e.g., NIST, Lambda, and Kappa).</a:t>
+              <a:t>Several abstract big data architectures are available (e.g., NIST, Lambda, and Kappa):</a:t>
             </a:r>
           </a:p>
           <a:p>
             <a:pPr lvl="1"/>
             <a:r>
               <a:rPr/>
-              <a:t>They provide the necessary functionalities for big-data applications but not their implementation</a:t>
+              <a:t>They provide the necessary functionalities for big-data applications but not their implementation.</a:t>
             </a:r>
           </a:p>
         </p:txBody>
@@ -8504,7 +8612,7 @@
             </a:pPr>
             <a:r>
               <a:rPr/>
-              <a:t>The description of data-driven processes should drive such activity</a:t>
+              <a:t>The description of data-driven processes should drive such activity!</a:t>
             </a:r>
           </a:p>
           <a:p>
@@ -8515,7 +8623,7 @@
             </a:r>
             <a:r>
               <a:rPr/>
-              <a:t> are the backbone of a data platform encode many constraints on the choices to be made</a:t>
+              <a:t> are the backbone of a data platform encode many constraints on the choices to be made…</a:t>
             </a:r>
           </a:p>
           <a:p>
@@ -8543,7 +8651,7 @@
             </a:r>
             <a:r>
               <a:rPr/>
-              <a:t> in selecting the services necessary to implement clients’ data pipelines out of the “unstructured” lists of services from CSPs</a:t>
+              <a:t> in selecting the services necessary to implement clients’ data pipelines out of the “unstructured” lists of services from CSPs.</a:t>
             </a:r>
           </a:p>
           <a:p>
@@ -8601,7 +8709,7 @@
             </a:r>
             <a:r>
               <a:rPr sz="2000"/>
-              <a:t>: IT experts with in-depth knowledge of services ecosystems</a:t>
+              <a:t>: IT experts with in-depth knowledge of services ecosystems;</a:t>
             </a:r>
           </a:p>
           <a:p>
@@ -8612,7 +8720,7 @@
             </a:r>
             <a:r>
               <a:rPr sz="2000"/>
-              <a:t>: people with expertise in designing data flows but with no vertical knowledge on service ecosystems</a:t>
+              <a:t>: people with expertise in designing data flows but with no vertical knowledge on service ecosystems;</a:t>
             </a:r>
           </a:p>
           <a:p>
@@ -8623,7 +8731,7 @@
             </a:r>
             <a:r>
               <a:rPr sz="2000"/>
-              <a:t> asking for the design of the data platform blueprint</a:t>
+              <a:t> asking for the design of the data platform blueprint.</a:t>
             </a:r>
           </a:p>
         </p:txBody>
@@ -8705,6 +8813,10 @@
               <a:rPr i="1"/>
               <a:t>una tantum</a:t>
             </a:r>
+            <a:r>
+              <a:rPr/>
+              <a:t>:</a:t>
+            </a:r>
           </a:p>
         </p:txBody>
       </p:sp>
@@ -8758,7 +8870,7 @@
             </a:r>
             <a:r>
               <a:rPr/>
-              <a:t> to compose the blueprint of the data platform</a:t>
+              <a:t> to compose the blueprint of the data platform:</a:t>
             </a:r>
           </a:p>
           <a:p>
@@ -8805,7 +8917,7 @@
             </a:r>
             <a:r>
               <a:rPr/>
-              <a:t> that characterize such services</a:t>
+              <a:t> that characterize such services:</a:t>
             </a:r>
           </a:p>
           <a:p>
@@ -8816,7 +8928,7 @@
             </a:r>
             <a:r>
               <a:rPr/>
-              <a:t> feeding: built out of the experience of the CSP and/or automatically extracted using NLP algorithms</a:t>
+              <a:t> feeding: built out of the experience of the CSP and/or automatically extracted using NLP algorithms;</a:t>
             </a:r>
           </a:p>
           <a:p>
@@ -8827,7 +8939,7 @@
             </a:r>
             <a:r>
               <a:rPr/>
-              <a:t> feeding: from the literature (e.g., Vs of big data)</a:t>
+              <a:t> feeding: from the literature (e.g., Vs of big data).</a:t>
             </a:r>
           </a:p>
         </p:txBody>

</xml_diff>

<commit_message>
Deploying to gh-pages from @ ManuelePasini/slides-markdown@7f5f406d864e1796bf7e6534a79d4cf503b6f927 🚀
</commit_message>
<xml_diff>
--- a/dolap_2024_slides.pptx
+++ b/dolap_2024_slides.pptx
@@ -8056,7 +8056,7 @@
             </a:r>
             <a:r>
               <a:rPr/>
-              <a:t>: services cover the entire data life cycle;</a:t>
+              <a:t>: services cover the entire data life cycle.</a:t>
             </a:r>
           </a:p>
         </p:txBody>
@@ -8327,7 +8327,7 @@
             <a:pPr lvl="0"/>
             <a:r>
               <a:rPr/>
-              <a:t>Third parties can publish their own services on marketplaces (e.g., AWS Marketplace);</a:t>
+              <a:t>Third parties can publish their own services on marketplaces (e.g., AWS Marketplace).</a:t>
             </a:r>
           </a:p>
         </p:txBody>
@@ -8526,7 +8526,7 @@
             <a:pPr lvl="1"/>
             <a:r>
               <a:rPr/>
-              <a:t>… and requires vertical knowledge on the design of data pipelines</a:t>
+              <a:t>… and requires vertical knowledge on the design of data pipelines.</a:t>
             </a:r>
           </a:p>
           <a:p>

</xml_diff>